<commit_message>
docs: Atualizar README.md com documentação completa
- Documentação detalhada de instalação e uso
- Instruções para deploy no GitHub/GitLab
- Especificações técnicas completas
- Guia de configuração de modelos PowerPoint
- Estrutura organizacional de arquivos
</commit_message>
<xml_diff>
--- a/modelos_nr/NR18_modelo.pptx
+++ b/modelos_nr/NR18_modelo.pptx
@@ -244,7 +244,7 @@
           <a:p>
             <a:fld id="{A3B7E9CD-3D34-47C6-98EC-7A5BB634A5D7}" type="datetimeFigureOut">
               <a:rPr lang="pt-BR" smtClean="0"/>
-              <a:t>17/06/2025</a:t>
+              <a:t>28/06/2025</a:t>
             </a:fld>
             <a:endParaRPr lang="pt-BR"/>
           </a:p>
@@ -414,7 +414,7 @@
           <a:p>
             <a:fld id="{A3B7E9CD-3D34-47C6-98EC-7A5BB634A5D7}" type="datetimeFigureOut">
               <a:rPr lang="pt-BR" smtClean="0"/>
-              <a:t>17/06/2025</a:t>
+              <a:t>28/06/2025</a:t>
             </a:fld>
             <a:endParaRPr lang="pt-BR"/>
           </a:p>
@@ -594,7 +594,7 @@
           <a:p>
             <a:fld id="{A3B7E9CD-3D34-47C6-98EC-7A5BB634A5D7}" type="datetimeFigureOut">
               <a:rPr lang="pt-BR" smtClean="0"/>
-              <a:t>17/06/2025</a:t>
+              <a:t>28/06/2025</a:t>
             </a:fld>
             <a:endParaRPr lang="pt-BR"/>
           </a:p>
@@ -764,7 +764,7 @@
           <a:p>
             <a:fld id="{A3B7E9CD-3D34-47C6-98EC-7A5BB634A5D7}" type="datetimeFigureOut">
               <a:rPr lang="pt-BR" smtClean="0"/>
-              <a:t>17/06/2025</a:t>
+              <a:t>28/06/2025</a:t>
             </a:fld>
             <a:endParaRPr lang="pt-BR"/>
           </a:p>
@@ -1008,7 +1008,7 @@
           <a:p>
             <a:fld id="{A3B7E9CD-3D34-47C6-98EC-7A5BB634A5D7}" type="datetimeFigureOut">
               <a:rPr lang="pt-BR" smtClean="0"/>
-              <a:t>17/06/2025</a:t>
+              <a:t>28/06/2025</a:t>
             </a:fld>
             <a:endParaRPr lang="pt-BR"/>
           </a:p>
@@ -1240,7 +1240,7 @@
           <a:p>
             <a:fld id="{A3B7E9CD-3D34-47C6-98EC-7A5BB634A5D7}" type="datetimeFigureOut">
               <a:rPr lang="pt-BR" smtClean="0"/>
-              <a:t>17/06/2025</a:t>
+              <a:t>28/06/2025</a:t>
             </a:fld>
             <a:endParaRPr lang="pt-BR"/>
           </a:p>
@@ -1607,7 +1607,7 @@
           <a:p>
             <a:fld id="{A3B7E9CD-3D34-47C6-98EC-7A5BB634A5D7}" type="datetimeFigureOut">
               <a:rPr lang="pt-BR" smtClean="0"/>
-              <a:t>17/06/2025</a:t>
+              <a:t>28/06/2025</a:t>
             </a:fld>
             <a:endParaRPr lang="pt-BR"/>
           </a:p>
@@ -1725,7 +1725,7 @@
           <a:p>
             <a:fld id="{A3B7E9CD-3D34-47C6-98EC-7A5BB634A5D7}" type="datetimeFigureOut">
               <a:rPr lang="pt-BR" smtClean="0"/>
-              <a:t>17/06/2025</a:t>
+              <a:t>28/06/2025</a:t>
             </a:fld>
             <a:endParaRPr lang="pt-BR"/>
           </a:p>
@@ -1820,7 +1820,7 @@
           <a:p>
             <a:fld id="{A3B7E9CD-3D34-47C6-98EC-7A5BB634A5D7}" type="datetimeFigureOut">
               <a:rPr lang="pt-BR" smtClean="0"/>
-              <a:t>17/06/2025</a:t>
+              <a:t>28/06/2025</a:t>
             </a:fld>
             <a:endParaRPr lang="pt-BR"/>
           </a:p>
@@ -2097,7 +2097,7 @@
           <a:p>
             <a:fld id="{A3B7E9CD-3D34-47C6-98EC-7A5BB634A5D7}" type="datetimeFigureOut">
               <a:rPr lang="pt-BR" smtClean="0"/>
-              <a:t>17/06/2025</a:t>
+              <a:t>28/06/2025</a:t>
             </a:fld>
             <a:endParaRPr lang="pt-BR"/>
           </a:p>
@@ -2354,7 +2354,7 @@
           <a:p>
             <a:fld id="{A3B7E9CD-3D34-47C6-98EC-7A5BB634A5D7}" type="datetimeFigureOut">
               <a:rPr lang="pt-BR" smtClean="0"/>
-              <a:t>17/06/2025</a:t>
+              <a:t>28/06/2025</a:t>
             </a:fld>
             <a:endParaRPr lang="pt-BR"/>
           </a:p>
@@ -2567,7 +2567,7 @@
           <a:p>
             <a:fld id="{A3B7E9CD-3D34-47C6-98EC-7A5BB634A5D7}" type="datetimeFigureOut">
               <a:rPr lang="pt-BR" smtClean="0"/>
-              <a:t>17/06/2025</a:t>
+              <a:t>28/06/2025</a:t>
             </a:fld>
             <a:endParaRPr lang="pt-BR"/>
           </a:p>
@@ -3778,8 +3778,8 @@
         </p:nvSpPr>
         <p:spPr>
           <a:xfrm>
-            <a:off x="3852809" y="4191178"/>
-            <a:ext cx="6498107" cy="1015663"/>
+            <a:off x="2466683" y="4191178"/>
+            <a:ext cx="7884234" cy="1015663"/>
           </a:xfrm>
           <a:prstGeom prst="rect">
             <a:avLst/>
@@ -3792,13 +3792,64 @@
           </a:bodyPr>
           <a:lstStyle/>
           <a:p>
-            <a:pPr algn="r"/>
+            <a:pPr algn="ctr"/>
             <a:r>
               <a:rPr lang="pt-BR" sz="1200" dirty="0">
                 <a:latin typeface="Times New Roman" panose="02020603050405020304" pitchFamily="18" charset="0"/>
                 <a:cs typeface="Times New Roman" panose="02020603050405020304" pitchFamily="18" charset="0"/>
               </a:rPr>
-              <a:t>{{NOME}}, portador do CPF {{CPF}}</a:t>
+              <a:t>{{NOME}} </a:t>
+            </a:r>
+            <a:r>
+              <a:rPr lang="pt-BR" altLang="zh-CN" sz="1200" b="1" dirty="0">
+                <a:solidFill>
+                  <a:srgbClr val="2D273D"/>
+                </a:solidFill>
+                <a:cs typeface="+mn-ea"/>
+                <a:sym typeface="+mn-lt"/>
+              </a:rPr>
+              <a:t>{{</a:t>
+            </a:r>
+            <a:r>
+              <a:rPr lang="pt-BR" altLang="zh-CN" sz="1200" b="1">
+                <a:solidFill>
+                  <a:srgbClr val="2D273D"/>
+                </a:solidFill>
+                <a:cs typeface="+mn-ea"/>
+                <a:sym typeface="+mn-lt"/>
+              </a:rPr>
+              <a:t>CARGO</a:t>
+            </a:r>
+            <a:r>
+              <a:rPr lang="pt-BR" altLang="zh-CN" sz="1200" b="1" u="sng">
+                <a:solidFill>
+                  <a:srgbClr val="2D273D"/>
+                </a:solidFill>
+                <a:cs typeface="+mn-ea"/>
+                <a:sym typeface="+mn-lt"/>
+              </a:rPr>
+              <a:t>}}</a:t>
+            </a:r>
+            <a:r>
+              <a:rPr lang="pt-BR" sz="1200" u="sng">
+                <a:latin typeface="Times New Roman" panose="02020603050405020304" pitchFamily="18" charset="0"/>
+                <a:cs typeface="Times New Roman" panose="02020603050405020304" pitchFamily="18" charset="0"/>
+              </a:rPr>
+              <a:t>,</a:t>
+            </a:r>
+            <a:r>
+              <a:rPr lang="pt-BR" sz="1200">
+                <a:latin typeface="Times New Roman" panose="02020603050405020304" pitchFamily="18" charset="0"/>
+                <a:cs typeface="Times New Roman" panose="02020603050405020304" pitchFamily="18" charset="0"/>
+              </a:rPr>
+              <a:t> </a:t>
+            </a:r>
+            <a:r>
+              <a:rPr lang="pt-BR" sz="1200" dirty="0">
+                <a:latin typeface="Times New Roman" panose="02020603050405020304" pitchFamily="18" charset="0"/>
+                <a:cs typeface="Times New Roman" panose="02020603050405020304" pitchFamily="18" charset="0"/>
+              </a:rPr>
+              <a:t>portador do CPF {{CPF}}</a:t>
             </a:r>
             <a:r>
               <a:rPr lang="pt-BR" altLang="ko-KR" sz="1200" dirty="0">
@@ -4870,6 +4921,84 @@
           </a:prstGeom>
         </p:spPr>
       </p:pic>
+      <p:sp>
+        <p:nvSpPr>
+          <p:cNvPr id="10" name="矩形 30">
+            <a:extLst>
+              <a:ext uri="{FF2B5EF4-FFF2-40B4-BE49-F238E27FC236}">
+                <a16:creationId xmlns:a16="http://schemas.microsoft.com/office/drawing/2014/main" id="{E2D50E54-CE0A-F3F1-71DB-5A5B40ADCFDE}"/>
+              </a:ext>
+            </a:extLst>
+          </p:cNvPr>
+          <p:cNvSpPr/>
+          <p:nvPr/>
+        </p:nvSpPr>
+        <p:spPr>
+          <a:xfrm>
+            <a:off x="6655929" y="3275521"/>
+            <a:ext cx="2187845" cy="461665"/>
+          </a:xfrm>
+          <a:prstGeom prst="rect">
+            <a:avLst/>
+          </a:prstGeom>
+          <a:noFill/>
+          <a:ln>
+            <a:noFill/>
+          </a:ln>
+          <a:effectLst/>
+          <a:extLst>
+            <a:ext uri="{909E8E84-426E-40DD-AFC4-6F175D3DCCD1}">
+              <a14:hiddenFill xmlns:a14="http://schemas.microsoft.com/office/drawing/2010/main">
+                <a:solidFill>
+                  <a:schemeClr val="accent1"/>
+                </a:solidFill>
+              </a14:hiddenFill>
+            </a:ext>
+            <a:ext uri="{91240B29-F687-4F45-9708-019B960494DF}">
+              <a14:hiddenLine xmlns:a14="http://schemas.microsoft.com/office/drawing/2010/main" w="9525">
+                <a:solidFill>
+                  <a:schemeClr val="tx1"/>
+                </a:solidFill>
+                <a:miter lim="800000"/>
+                <a:headEnd/>
+                <a:tailEnd/>
+              </a14:hiddenLine>
+            </a:ext>
+            <a:ext uri="{AF507438-7753-43E0-B8FC-AC1667EBCBE1}">
+              <a14:hiddenEffects xmlns:a14="http://schemas.microsoft.com/office/drawing/2010/main">
+                <a:effectLst>
+                  <a:outerShdw dist="35921" dir="2700000" algn="ctr" rotWithShape="0">
+                    <a:schemeClr val="bg2"/>
+                  </a:outerShdw>
+                </a:effectLst>
+              </a14:hiddenEffects>
+            </a:ext>
+          </a:extLst>
+        </p:spPr>
+        <p:txBody>
+          <a:bodyPr wrap="square">
+            <a:spAutoFit/>
+          </a:bodyPr>
+          <a:lstStyle/>
+          <a:p>
+            <a:pPr algn="ctr"/>
+            <a:endParaRPr lang="pt-BR" sz="1200" dirty="0"/>
+          </a:p>
+          <a:p>
+            <a:pPr algn="ctr"/>
+            <a:r>
+              <a:rPr lang="pt-BR" altLang="zh-CN" sz="1200" b="1" dirty="0">
+                <a:solidFill>
+                  <a:srgbClr val="2D273D"/>
+                </a:solidFill>
+                <a:cs typeface="+mn-ea"/>
+                <a:sym typeface="+mn-lt"/>
+              </a:rPr>
+              <a:t>{{CARGO}}</a:t>
+            </a:r>
+          </a:p>
+        </p:txBody>
+      </p:sp>
     </p:spTree>
     <p:extLst>
       <p:ext uri="{BB962C8B-B14F-4D97-AF65-F5344CB8AC3E}">

</xml_diff>